<commit_message>
New  I2C backplane spec supported
</commit_message>
<xml_diff>
--- a/doc/I2C_BACKPLANE_SPEC.pptx
+++ b/doc/I2C_BACKPLANE_SPEC.pptx
@@ -6273,7 +6273,7 @@
         </p:nvCxnSpPr>
         <p:spPr>
           <a:xfrm flipH="1">
-            <a:off x="1104507" y="1970202"/>
+            <a:off x="1104507" y="2432116"/>
             <a:ext cx="4900367" cy="0"/>
           </a:xfrm>
           <a:prstGeom prst="straightConnector1">
@@ -6368,7 +6368,7 @@
         </p:nvCxnSpPr>
         <p:spPr>
           <a:xfrm flipH="1">
-            <a:off x="1096651" y="2047186"/>
+            <a:off x="1096651" y="2509100"/>
             <a:ext cx="4900367" cy="0"/>
           </a:xfrm>
           <a:prstGeom prst="straightConnector1">
@@ -6495,7 +6495,7 @@
         </p:nvCxnSpPr>
         <p:spPr>
           <a:xfrm flipH="1">
-            <a:off x="3351231" y="2366125"/>
+            <a:off x="3351231" y="3110844"/>
             <a:ext cx="2653643" cy="0"/>
           </a:xfrm>
           <a:prstGeom prst="straightConnector1">
@@ -6530,7 +6530,7 @@
         </p:nvCxnSpPr>
         <p:spPr>
           <a:xfrm flipH="1">
-            <a:off x="2284429" y="2923884"/>
+            <a:off x="2284429" y="3668603"/>
             <a:ext cx="3722016" cy="0"/>
           </a:xfrm>
           <a:prstGeom prst="straightConnector1">
@@ -6565,7 +6565,7 @@
         </p:nvCxnSpPr>
         <p:spPr>
           <a:xfrm flipH="1">
-            <a:off x="2276572" y="3095138"/>
+            <a:off x="2276572" y="3839857"/>
             <a:ext cx="3722016" cy="0"/>
           </a:xfrm>
           <a:prstGeom prst="straightConnector1">
@@ -6601,7 +6601,7 @@
         </p:nvCxnSpPr>
         <p:spPr>
           <a:xfrm flipH="1">
-            <a:off x="2284429" y="4714969"/>
+            <a:off x="2284429" y="5459688"/>
             <a:ext cx="3722016" cy="0"/>
           </a:xfrm>
           <a:prstGeom prst="straightConnector1">
@@ -6636,7 +6636,7 @@
         </p:nvCxnSpPr>
         <p:spPr>
           <a:xfrm flipH="1">
-            <a:off x="3351231" y="3425076"/>
+            <a:off x="3351231" y="4169795"/>
             <a:ext cx="2666210" cy="0"/>
           </a:xfrm>
           <a:prstGeom prst="straightConnector1">
@@ -6671,7 +6671,7 @@
         </p:nvCxnSpPr>
         <p:spPr>
           <a:xfrm flipH="1">
-            <a:off x="3351231" y="3596330"/>
+            <a:off x="3351231" y="4341049"/>
             <a:ext cx="2658353" cy="0"/>
           </a:xfrm>
           <a:prstGeom prst="straightConnector1">
@@ -6707,7 +6707,7 @@
         </p:nvCxnSpPr>
         <p:spPr>
           <a:xfrm flipH="1">
-            <a:off x="2278151" y="4898799"/>
+            <a:off x="2278151" y="5643518"/>
             <a:ext cx="3726723" cy="0"/>
           </a:xfrm>
           <a:prstGeom prst="straightConnector1">
@@ -6817,8 +6817,8 @@
         </p:nvSpPr>
         <p:spPr>
           <a:xfrm>
-            <a:off x="4221207" y="1766685"/>
-            <a:ext cx="1032655" cy="276999"/>
+            <a:off x="3806429" y="2228599"/>
+            <a:ext cx="1380506" cy="276999"/>
           </a:xfrm>
           <a:prstGeom prst="rect">
             <a:avLst/>
@@ -6833,6 +6833,14 @@
           <a:p>
             <a:r>
               <a:rPr kumimoji="1" lang="en-US" altLang="ja-JP" sz="1200" dirty="0"/>
+              <a:t>PLG</a:t>
+            </a:r>
+            <a:r>
+              <a:rPr kumimoji="1" lang="ja-JP" altLang="en-US" sz="1200" dirty="0"/>
+              <a:t> </a:t>
+            </a:r>
+            <a:r>
+              <a:rPr kumimoji="1" lang="en-US" altLang="ja-JP" sz="1200" dirty="0"/>
               <a:t>General call</a:t>
             </a:r>
             <a:endParaRPr kumimoji="1" lang="ja-JP" altLang="en-US" sz="1200" dirty="0"/>
@@ -6866,6 +6874,216 @@
               <a:t>Master</a:t>
             </a:r>
             <a:endParaRPr kumimoji="1" lang="ja-JP" altLang="en-US" sz="1400" dirty="0"/>
+          </a:p>
+        </p:txBody>
+      </p:sp>
+      <p:sp>
+        <p:nvSpPr>
+          <p:cNvPr id="24" name="テキスト ボックス 23"/>
+          <p:cNvSpPr txBox="1"/>
+          <p:nvPr/>
+        </p:nvSpPr>
+        <p:spPr>
+          <a:xfrm>
+            <a:off x="4232207" y="2894030"/>
+            <a:ext cx="764000" cy="276999"/>
+          </a:xfrm>
+          <a:prstGeom prst="rect">
+            <a:avLst/>
+          </a:prstGeom>
+          <a:noFill/>
+        </p:spPr>
+        <p:txBody>
+          <a:bodyPr wrap="square" rtlCol="0">
+            <a:spAutoFit/>
+          </a:bodyPr>
+          <a:lstStyle/>
+          <a:p>
+            <a:r>
+              <a:rPr kumimoji="1" lang="en-US" altLang="ja-JP" sz="1200" dirty="0"/>
+              <a:t>CMD</a:t>
+            </a:r>
+            <a:endParaRPr kumimoji="1" lang="ja-JP" altLang="en-US" sz="1200" dirty="0"/>
+          </a:p>
+        </p:txBody>
+      </p:sp>
+      <p:sp>
+        <p:nvSpPr>
+          <p:cNvPr id="25" name="テキスト ボックス 24"/>
+          <p:cNvSpPr txBox="1"/>
+          <p:nvPr/>
+        </p:nvSpPr>
+        <p:spPr>
+          <a:xfrm>
+            <a:off x="4318618" y="3461209"/>
+            <a:ext cx="764000" cy="276999"/>
+          </a:xfrm>
+          <a:prstGeom prst="rect">
+            <a:avLst/>
+          </a:prstGeom>
+          <a:noFill/>
+        </p:spPr>
+        <p:txBody>
+          <a:bodyPr wrap="square" rtlCol="0">
+            <a:spAutoFit/>
+          </a:bodyPr>
+          <a:lstStyle/>
+          <a:p>
+            <a:r>
+              <a:rPr lang="en-US" altLang="ja-JP" sz="1200" dirty="0"/>
+              <a:t>INV</a:t>
+            </a:r>
+            <a:endParaRPr kumimoji="1" lang="ja-JP" altLang="en-US" sz="1200" dirty="0"/>
+          </a:p>
+        </p:txBody>
+      </p:sp>
+      <p:sp>
+        <p:nvSpPr>
+          <p:cNvPr id="31" name="テキスト ボックス 30"/>
+          <p:cNvSpPr txBox="1"/>
+          <p:nvPr/>
+        </p:nvSpPr>
+        <p:spPr>
+          <a:xfrm>
+            <a:off x="4291907" y="3632463"/>
+            <a:ext cx="764000" cy="276999"/>
+          </a:xfrm>
+          <a:prstGeom prst="rect">
+            <a:avLst/>
+          </a:prstGeom>
+          <a:noFill/>
+        </p:spPr>
+        <p:txBody>
+          <a:bodyPr wrap="square" rtlCol="0">
+            <a:spAutoFit/>
+          </a:bodyPr>
+          <a:lstStyle/>
+          <a:p>
+            <a:r>
+              <a:rPr kumimoji="1" lang="en-US" altLang="ja-JP" sz="1200" dirty="0"/>
+              <a:t>SEN</a:t>
+            </a:r>
+            <a:endParaRPr kumimoji="1" lang="ja-JP" altLang="en-US" sz="1200" dirty="0"/>
+          </a:p>
+        </p:txBody>
+      </p:sp>
+      <p:sp>
+        <p:nvSpPr>
+          <p:cNvPr id="32" name="テキスト ボックス 31"/>
+          <p:cNvSpPr txBox="1"/>
+          <p:nvPr/>
+        </p:nvSpPr>
+        <p:spPr>
+          <a:xfrm>
+            <a:off x="4320188" y="3971828"/>
+            <a:ext cx="764000" cy="276999"/>
+          </a:xfrm>
+          <a:prstGeom prst="rect">
+            <a:avLst/>
+          </a:prstGeom>
+          <a:noFill/>
+        </p:spPr>
+        <p:txBody>
+          <a:bodyPr wrap="square" rtlCol="0">
+            <a:spAutoFit/>
+          </a:bodyPr>
+          <a:lstStyle/>
+          <a:p>
+            <a:r>
+              <a:rPr lang="en-US" altLang="ja-JP" sz="1200" dirty="0"/>
+              <a:t>INV</a:t>
+            </a:r>
+            <a:endParaRPr kumimoji="1" lang="ja-JP" altLang="en-US" sz="1200" dirty="0"/>
+          </a:p>
+        </p:txBody>
+      </p:sp>
+      <p:sp>
+        <p:nvSpPr>
+          <p:cNvPr id="34" name="テキスト ボックス 33"/>
+          <p:cNvSpPr txBox="1"/>
+          <p:nvPr/>
+        </p:nvSpPr>
+        <p:spPr>
+          <a:xfrm>
+            <a:off x="4293477" y="4143082"/>
+            <a:ext cx="764000" cy="276999"/>
+          </a:xfrm>
+          <a:prstGeom prst="rect">
+            <a:avLst/>
+          </a:prstGeom>
+          <a:noFill/>
+        </p:spPr>
+        <p:txBody>
+          <a:bodyPr wrap="square" rtlCol="0">
+            <a:spAutoFit/>
+          </a:bodyPr>
+          <a:lstStyle/>
+          <a:p>
+            <a:r>
+              <a:rPr kumimoji="1" lang="en-US" altLang="ja-JP" sz="1200" dirty="0"/>
+              <a:t>SEN</a:t>
+            </a:r>
+            <a:endParaRPr kumimoji="1" lang="ja-JP" altLang="en-US" sz="1200" dirty="0"/>
+          </a:p>
+        </p:txBody>
+      </p:sp>
+      <p:sp>
+        <p:nvSpPr>
+          <p:cNvPr id="36" name="テキスト ボックス 35"/>
+          <p:cNvSpPr txBox="1"/>
+          <p:nvPr/>
+        </p:nvSpPr>
+        <p:spPr>
+          <a:xfrm>
+            <a:off x="4340615" y="5264871"/>
+            <a:ext cx="764000" cy="276999"/>
+          </a:xfrm>
+          <a:prstGeom prst="rect">
+            <a:avLst/>
+          </a:prstGeom>
+          <a:noFill/>
+        </p:spPr>
+        <p:txBody>
+          <a:bodyPr wrap="square" rtlCol="0">
+            <a:spAutoFit/>
+          </a:bodyPr>
+          <a:lstStyle/>
+          <a:p>
+            <a:r>
+              <a:rPr lang="en-US" altLang="ja-JP" sz="1200" dirty="0"/>
+              <a:t>INV</a:t>
+            </a:r>
+            <a:endParaRPr kumimoji="1" lang="ja-JP" altLang="en-US" sz="1200" dirty="0"/>
+          </a:p>
+        </p:txBody>
+      </p:sp>
+      <p:sp>
+        <p:nvSpPr>
+          <p:cNvPr id="38" name="テキスト ボックス 37"/>
+          <p:cNvSpPr txBox="1"/>
+          <p:nvPr/>
+        </p:nvSpPr>
+        <p:spPr>
+          <a:xfrm>
+            <a:off x="4313904" y="5436125"/>
+            <a:ext cx="764000" cy="276999"/>
+          </a:xfrm>
+          <a:prstGeom prst="rect">
+            <a:avLst/>
+          </a:prstGeom>
+          <a:noFill/>
+        </p:spPr>
+        <p:txBody>
+          <a:bodyPr wrap="square" rtlCol="0">
+            <a:spAutoFit/>
+          </a:bodyPr>
+          <a:lstStyle/>
+          <a:p>
+            <a:r>
+              <a:rPr kumimoji="1" lang="en-US" altLang="ja-JP" sz="1200" dirty="0"/>
+              <a:t>SEN</a:t>
+            </a:r>
+            <a:endParaRPr kumimoji="1" lang="ja-JP" altLang="en-US" sz="1200" dirty="0"/>
           </a:p>
         </p:txBody>
       </p:sp>
@@ -7949,8 +8167,8 @@
         </p:nvSpPr>
         <p:spPr>
           <a:xfrm>
-            <a:off x="10237708" y="3317790"/>
-            <a:ext cx="1994457" cy="369332"/>
+            <a:off x="10126965" y="3348567"/>
+            <a:ext cx="1590500" cy="307777"/>
           </a:xfrm>
           <a:prstGeom prst="rect">
             <a:avLst/>
@@ -7964,10 +8182,10 @@
           <a:lstStyle/>
           <a:p>
             <a:r>
-              <a:rPr kumimoji="1" lang="en-US" altLang="ja-JP" dirty="0"/>
+              <a:rPr kumimoji="1" lang="en-US" altLang="ja-JP" sz="1400" dirty="0"/>
               <a:t>50msec time slot</a:t>
             </a:r>
-            <a:endParaRPr kumimoji="1" lang="ja-JP" altLang="en-US" dirty="0"/>
+            <a:endParaRPr kumimoji="1" lang="ja-JP" altLang="en-US" sz="1400" dirty="0"/>
           </a:p>
         </p:txBody>
       </p:sp>
@@ -7979,8 +8197,8 @@
         </p:nvSpPr>
         <p:spPr>
           <a:xfrm>
-            <a:off x="10164896" y="5321771"/>
-            <a:ext cx="1994457" cy="369332"/>
+            <a:off x="10159408" y="5352548"/>
+            <a:ext cx="1590500" cy="307777"/>
           </a:xfrm>
           <a:prstGeom prst="rect">
             <a:avLst/>
@@ -7994,10 +8212,10 @@
           <a:lstStyle/>
           <a:p>
             <a:r>
-              <a:rPr kumimoji="1" lang="en-US" altLang="ja-JP" dirty="0"/>
+              <a:rPr kumimoji="1" lang="en-US" altLang="ja-JP" sz="1400" dirty="0"/>
               <a:t>50msec time slot</a:t>
             </a:r>
-            <a:endParaRPr kumimoji="1" lang="ja-JP" altLang="en-US" dirty="0"/>
+            <a:endParaRPr kumimoji="1" lang="ja-JP" altLang="en-US" sz="1400" dirty="0"/>
           </a:p>
         </p:txBody>
       </p:sp>
@@ -8009,8 +8227,8 @@
         </p:nvSpPr>
         <p:spPr>
           <a:xfrm>
-            <a:off x="0" y="3085512"/>
-            <a:ext cx="2977097" cy="369332"/>
+            <a:off x="479336" y="3300955"/>
+            <a:ext cx="2358338" cy="307777"/>
           </a:xfrm>
           <a:prstGeom prst="rect">
             <a:avLst/>
@@ -8024,10 +8242,10 @@
           <a:lstStyle/>
           <a:p>
             <a:r>
-              <a:rPr kumimoji="1" lang="en-US" altLang="ja-JP" dirty="0"/>
+              <a:rPr kumimoji="1" lang="en-US" altLang="ja-JP" sz="1400" dirty="0"/>
               <a:t>Must be less than 50msec</a:t>
             </a:r>
-            <a:endParaRPr kumimoji="1" lang="ja-JP" altLang="en-US" dirty="0"/>
+            <a:endParaRPr kumimoji="1" lang="ja-JP" altLang="en-US" sz="1400" dirty="0"/>
           </a:p>
         </p:txBody>
       </p:sp>

</xml_diff>

<commit_message>
I2C backplane spec update
</commit_message>
<xml_diff>
--- a/doc/I2C_BACKPLANE_SPEC.pptx
+++ b/doc/I2C_BACKPLANE_SPEC.pptx
@@ -252,7 +252,7 @@
           <a:p>
             <a:fld id="{89DDC5F7-2580-4636-96AE-BDAAE81E0478}" type="datetimeFigureOut">
               <a:rPr kumimoji="1" lang="ja-JP" altLang="en-US" smtClean="0"/>
-              <a:t>2017/6/14</a:t>
+              <a:t>2017/6/24</a:t>
             </a:fld>
             <a:endParaRPr kumimoji="1" lang="ja-JP" altLang="en-US"/>
           </a:p>
@@ -452,7 +452,7 @@
           <a:p>
             <a:fld id="{89DDC5F7-2580-4636-96AE-BDAAE81E0478}" type="datetimeFigureOut">
               <a:rPr kumimoji="1" lang="ja-JP" altLang="en-US" smtClean="0"/>
-              <a:t>2017/6/14</a:t>
+              <a:t>2017/6/24</a:t>
             </a:fld>
             <a:endParaRPr kumimoji="1" lang="ja-JP" altLang="en-US"/>
           </a:p>
@@ -662,7 +662,7 @@
           <a:p>
             <a:fld id="{89DDC5F7-2580-4636-96AE-BDAAE81E0478}" type="datetimeFigureOut">
               <a:rPr kumimoji="1" lang="ja-JP" altLang="en-US" smtClean="0"/>
-              <a:t>2017/6/14</a:t>
+              <a:t>2017/6/24</a:t>
             </a:fld>
             <a:endParaRPr kumimoji="1" lang="ja-JP" altLang="en-US"/>
           </a:p>
@@ -862,7 +862,7 @@
           <a:p>
             <a:fld id="{89DDC5F7-2580-4636-96AE-BDAAE81E0478}" type="datetimeFigureOut">
               <a:rPr kumimoji="1" lang="ja-JP" altLang="en-US" smtClean="0"/>
-              <a:t>2017/6/14</a:t>
+              <a:t>2017/6/24</a:t>
             </a:fld>
             <a:endParaRPr kumimoji="1" lang="ja-JP" altLang="en-US"/>
           </a:p>
@@ -1107,7 +1107,7 @@
           <a:p>
             <a:fld id="{89DDC5F7-2580-4636-96AE-BDAAE81E0478}" type="datetimeFigureOut">
               <a:rPr kumimoji="1" lang="ja-JP" altLang="en-US" smtClean="0"/>
-              <a:t>2017/6/14</a:t>
+              <a:t>2017/6/24</a:t>
             </a:fld>
             <a:endParaRPr kumimoji="1" lang="ja-JP" altLang="en-US"/>
           </a:p>
@@ -1400,7 +1400,7 @@
           <a:p>
             <a:fld id="{89DDC5F7-2580-4636-96AE-BDAAE81E0478}" type="datetimeFigureOut">
               <a:rPr kumimoji="1" lang="ja-JP" altLang="en-US" smtClean="0"/>
-              <a:t>2017/6/14</a:t>
+              <a:t>2017/6/24</a:t>
             </a:fld>
             <a:endParaRPr kumimoji="1" lang="ja-JP" altLang="en-US"/>
           </a:p>
@@ -1828,7 +1828,7 @@
           <a:p>
             <a:fld id="{89DDC5F7-2580-4636-96AE-BDAAE81E0478}" type="datetimeFigureOut">
               <a:rPr kumimoji="1" lang="ja-JP" altLang="en-US" smtClean="0"/>
-              <a:t>2017/6/14</a:t>
+              <a:t>2017/6/24</a:t>
             </a:fld>
             <a:endParaRPr kumimoji="1" lang="ja-JP" altLang="en-US"/>
           </a:p>
@@ -1945,7 +1945,7 @@
           <a:p>
             <a:fld id="{89DDC5F7-2580-4636-96AE-BDAAE81E0478}" type="datetimeFigureOut">
               <a:rPr kumimoji="1" lang="ja-JP" altLang="en-US" smtClean="0"/>
-              <a:t>2017/6/14</a:t>
+              <a:t>2017/6/24</a:t>
             </a:fld>
             <a:endParaRPr kumimoji="1" lang="ja-JP" altLang="en-US"/>
           </a:p>
@@ -2040,7 +2040,7 @@
           <a:p>
             <a:fld id="{89DDC5F7-2580-4636-96AE-BDAAE81E0478}" type="datetimeFigureOut">
               <a:rPr kumimoji="1" lang="ja-JP" altLang="en-US" smtClean="0"/>
-              <a:t>2017/6/14</a:t>
+              <a:t>2017/6/24</a:t>
             </a:fld>
             <a:endParaRPr kumimoji="1" lang="ja-JP" altLang="en-US"/>
           </a:p>
@@ -2347,7 +2347,7 @@
           <a:p>
             <a:fld id="{89DDC5F7-2580-4636-96AE-BDAAE81E0478}" type="datetimeFigureOut">
               <a:rPr kumimoji="1" lang="ja-JP" altLang="en-US" smtClean="0"/>
-              <a:t>2017/6/14</a:t>
+              <a:t>2017/6/24</a:t>
             </a:fld>
             <a:endParaRPr kumimoji="1" lang="ja-JP" altLang="en-US"/>
           </a:p>
@@ -2599,7 +2599,7 @@
           <a:p>
             <a:fld id="{89DDC5F7-2580-4636-96AE-BDAAE81E0478}" type="datetimeFigureOut">
               <a:rPr kumimoji="1" lang="ja-JP" altLang="en-US" smtClean="0"/>
-              <a:t>2017/6/14</a:t>
+              <a:t>2017/6/24</a:t>
             </a:fld>
             <a:endParaRPr kumimoji="1" lang="ja-JP" altLang="en-US"/>
           </a:p>
@@ -2842,7 +2842,7 @@
           <a:p>
             <a:fld id="{89DDC5F7-2580-4636-96AE-BDAAE81E0478}" type="datetimeFigureOut">
               <a:rPr kumimoji="1" lang="ja-JP" altLang="en-US" smtClean="0"/>
-              <a:t>2017/6/14</a:t>
+              <a:t>2017/6/24</a:t>
             </a:fld>
             <a:endParaRPr kumimoji="1" lang="ja-JP" altLang="en-US"/>
           </a:p>
@@ -10372,6 +10372,51 @@
           </a:p>
         </p:txBody>
       </p:sp>
+      <p:sp>
+        <p:nvSpPr>
+          <p:cNvPr id="5" name="テキスト ボックス 4">
+            <a:extLst>
+              <a:ext uri="{FF2B5EF4-FFF2-40B4-BE49-F238E27FC236}">
+                <a16:creationId xmlns:a16="http://schemas.microsoft.com/office/drawing/2014/main" id="{C245316B-335C-4ED0-832C-BA2AEF7843A3}"/>
+              </a:ext>
+            </a:extLst>
+          </p:cNvPr>
+          <p:cNvSpPr txBox="1"/>
+          <p:nvPr/>
+        </p:nvSpPr>
+        <p:spPr>
+          <a:xfrm>
+            <a:off x="610010" y="3925578"/>
+            <a:ext cx="3704506" cy="523220"/>
+          </a:xfrm>
+          <a:prstGeom prst="rect">
+            <a:avLst/>
+          </a:prstGeom>
+          <a:solidFill>
+            <a:schemeClr val="bg1"/>
+          </a:solidFill>
+          <a:ln>
+            <a:solidFill>
+              <a:schemeClr val="accent2">
+                <a:lumMod val="60000"/>
+                <a:lumOff val="40000"/>
+              </a:schemeClr>
+            </a:solidFill>
+          </a:ln>
+        </p:spPr>
+        <p:txBody>
+          <a:bodyPr wrap="square" rtlCol="0">
+            <a:spAutoFit/>
+          </a:bodyPr>
+          <a:lstStyle/>
+          <a:p>
+            <a:r>
+              <a:rPr lang="en-US" sz="1400" dirty="0"/>
+              <a:t>Note: SSP1CON2 bit 0 (SEN) is set to 1 to enable clock stretching.</a:t>
+            </a:r>
+          </a:p>
+        </p:txBody>
+      </p:sp>
     </p:spTree>
     <p:extLst>
       <p:ext uri="{BB962C8B-B14F-4D97-AF65-F5344CB8AC3E}">

</xml_diff>

<commit_message>
Backplane master's baud rate to 115200
</commit_message>
<xml_diff>
--- a/doc/I2C_BACKPLANE_SPEC.pptx
+++ b/doc/I2C_BACKPLANE_SPEC.pptx
@@ -8,11 +8,10 @@
     <p:sldId id="256" r:id="rId2"/>
     <p:sldId id="259" r:id="rId3"/>
     <p:sldId id="260" r:id="rId4"/>
-    <p:sldId id="264" r:id="rId5"/>
-    <p:sldId id="258" r:id="rId6"/>
-    <p:sldId id="261" r:id="rId7"/>
-    <p:sldId id="263" r:id="rId8"/>
-    <p:sldId id="265" r:id="rId9"/>
+    <p:sldId id="258" r:id="rId5"/>
+    <p:sldId id="261" r:id="rId6"/>
+    <p:sldId id="263" r:id="rId7"/>
+    <p:sldId id="265" r:id="rId8"/>
   </p:sldIdLst>
   <p:sldSz cx="12192000" cy="6858000"/>
   <p:notesSz cx="6858000" cy="9144000"/>
@@ -252,7 +251,7 @@
           <a:p>
             <a:fld id="{89DDC5F7-2580-4636-96AE-BDAAE81E0478}" type="datetimeFigureOut">
               <a:rPr kumimoji="1" lang="ja-JP" altLang="en-US" smtClean="0"/>
-              <a:t>2017/6/24</a:t>
+              <a:t>2017/7/3</a:t>
             </a:fld>
             <a:endParaRPr kumimoji="1" lang="ja-JP" altLang="en-US"/>
           </a:p>
@@ -452,7 +451,7 @@
           <a:p>
             <a:fld id="{89DDC5F7-2580-4636-96AE-BDAAE81E0478}" type="datetimeFigureOut">
               <a:rPr kumimoji="1" lang="ja-JP" altLang="en-US" smtClean="0"/>
-              <a:t>2017/6/24</a:t>
+              <a:t>2017/7/3</a:t>
             </a:fld>
             <a:endParaRPr kumimoji="1" lang="ja-JP" altLang="en-US"/>
           </a:p>
@@ -662,7 +661,7 @@
           <a:p>
             <a:fld id="{89DDC5F7-2580-4636-96AE-BDAAE81E0478}" type="datetimeFigureOut">
               <a:rPr kumimoji="1" lang="ja-JP" altLang="en-US" smtClean="0"/>
-              <a:t>2017/6/24</a:t>
+              <a:t>2017/7/3</a:t>
             </a:fld>
             <a:endParaRPr kumimoji="1" lang="ja-JP" altLang="en-US"/>
           </a:p>
@@ -862,7 +861,7 @@
           <a:p>
             <a:fld id="{89DDC5F7-2580-4636-96AE-BDAAE81E0478}" type="datetimeFigureOut">
               <a:rPr kumimoji="1" lang="ja-JP" altLang="en-US" smtClean="0"/>
-              <a:t>2017/6/24</a:t>
+              <a:t>2017/7/3</a:t>
             </a:fld>
             <a:endParaRPr kumimoji="1" lang="ja-JP" altLang="en-US"/>
           </a:p>
@@ -1107,7 +1106,7 @@
           <a:p>
             <a:fld id="{89DDC5F7-2580-4636-96AE-BDAAE81E0478}" type="datetimeFigureOut">
               <a:rPr kumimoji="1" lang="ja-JP" altLang="en-US" smtClean="0"/>
-              <a:t>2017/6/24</a:t>
+              <a:t>2017/7/3</a:t>
             </a:fld>
             <a:endParaRPr kumimoji="1" lang="ja-JP" altLang="en-US"/>
           </a:p>
@@ -1400,7 +1399,7 @@
           <a:p>
             <a:fld id="{89DDC5F7-2580-4636-96AE-BDAAE81E0478}" type="datetimeFigureOut">
               <a:rPr kumimoji="1" lang="ja-JP" altLang="en-US" smtClean="0"/>
-              <a:t>2017/6/24</a:t>
+              <a:t>2017/7/3</a:t>
             </a:fld>
             <a:endParaRPr kumimoji="1" lang="ja-JP" altLang="en-US"/>
           </a:p>
@@ -1828,7 +1827,7 @@
           <a:p>
             <a:fld id="{89DDC5F7-2580-4636-96AE-BDAAE81E0478}" type="datetimeFigureOut">
               <a:rPr kumimoji="1" lang="ja-JP" altLang="en-US" smtClean="0"/>
-              <a:t>2017/6/24</a:t>
+              <a:t>2017/7/3</a:t>
             </a:fld>
             <a:endParaRPr kumimoji="1" lang="ja-JP" altLang="en-US"/>
           </a:p>
@@ -1945,7 +1944,7 @@
           <a:p>
             <a:fld id="{89DDC5F7-2580-4636-96AE-BDAAE81E0478}" type="datetimeFigureOut">
               <a:rPr kumimoji="1" lang="ja-JP" altLang="en-US" smtClean="0"/>
-              <a:t>2017/6/24</a:t>
+              <a:t>2017/7/3</a:t>
             </a:fld>
             <a:endParaRPr kumimoji="1" lang="ja-JP" altLang="en-US"/>
           </a:p>
@@ -2040,7 +2039,7 @@
           <a:p>
             <a:fld id="{89DDC5F7-2580-4636-96AE-BDAAE81E0478}" type="datetimeFigureOut">
               <a:rPr kumimoji="1" lang="ja-JP" altLang="en-US" smtClean="0"/>
-              <a:t>2017/6/24</a:t>
+              <a:t>2017/7/3</a:t>
             </a:fld>
             <a:endParaRPr kumimoji="1" lang="ja-JP" altLang="en-US"/>
           </a:p>
@@ -2347,7 +2346,7 @@
           <a:p>
             <a:fld id="{89DDC5F7-2580-4636-96AE-BDAAE81E0478}" type="datetimeFigureOut">
               <a:rPr kumimoji="1" lang="ja-JP" altLang="en-US" smtClean="0"/>
-              <a:t>2017/6/24</a:t>
+              <a:t>2017/7/3</a:t>
             </a:fld>
             <a:endParaRPr kumimoji="1" lang="ja-JP" altLang="en-US"/>
           </a:p>
@@ -2599,7 +2598,7 @@
           <a:p>
             <a:fld id="{89DDC5F7-2580-4636-96AE-BDAAE81E0478}" type="datetimeFigureOut">
               <a:rPr kumimoji="1" lang="ja-JP" altLang="en-US" smtClean="0"/>
-              <a:t>2017/6/24</a:t>
+              <a:t>2017/7/3</a:t>
             </a:fld>
             <a:endParaRPr kumimoji="1" lang="ja-JP" altLang="en-US"/>
           </a:p>
@@ -2842,7 +2841,7 @@
           <a:p>
             <a:fld id="{89DDC5F7-2580-4636-96AE-BDAAE81E0478}" type="datetimeFigureOut">
               <a:rPr kumimoji="1" lang="ja-JP" altLang="en-US" smtClean="0"/>
-              <a:t>2017/6/24</a:t>
+              <a:t>2017/7/3</a:t>
             </a:fld>
             <a:endParaRPr kumimoji="1" lang="ja-JP" altLang="en-US"/>
           </a:p>
@@ -3367,12 +3366,21 @@
             </a:r>
           </a:p>
           <a:p>
+            <a:pPr lvl="1"/>
+            <a:r>
+              <a:rPr lang="en-US" altLang="ja-JP" dirty="0"/>
+              <a:t>Bus speed: 100kbps</a:t>
+            </a:r>
+          </a:p>
+          <a:p>
+            <a:pPr lvl="1"/>
             <a:r>
               <a:rPr kumimoji="1" lang="en-US" altLang="ja-JP" dirty="0"/>
-              <a:t>Max seven I2C slaves supported</a:t>
-            </a:r>
-          </a:p>
-          <a:p>
+              <a:t>Scheduler: time-slot-based</a:t>
+            </a:r>
+          </a:p>
+          <a:p>
+            <a:pPr lvl="1"/>
             <a:r>
               <a:rPr lang="en-US" altLang="ja-JP" dirty="0" err="1"/>
               <a:t>Plug&amp;play</a:t>
@@ -3381,7 +3389,9 @@
               <a:rPr lang="en-US" altLang="ja-JP" dirty="0"/>
               <a:t> with I2C general call</a:t>
             </a:r>
-            <a:endParaRPr kumimoji="1" lang="ja-JP" altLang="en-US" dirty="0"/>
+          </a:p>
+          <a:p>
+            <a:endParaRPr lang="en-US" altLang="ja-JP" dirty="0"/>
           </a:p>
         </p:txBody>
       </p:sp>
@@ -4628,7 +4638,7 @@
         <p:spPr>
           <a:xfrm>
             <a:off x="8051777" y="3768133"/>
-            <a:ext cx="1790875" cy="430887"/>
+            <a:ext cx="1721946" cy="430887"/>
           </a:xfrm>
           <a:prstGeom prst="rect">
             <a:avLst/>
@@ -4643,7 +4653,7 @@
           <a:p>
             <a:r>
               <a:rPr lang="en-US" altLang="ja-JP" sz="1100" dirty="0"/>
-              <a:t>Interval: 50msec * scaler</a:t>
+              <a:t>Interval: 8msec * scaler</a:t>
             </a:r>
           </a:p>
           <a:p>
@@ -4825,185 +4835,6 @@
             <p:ph type="title"/>
           </p:nvPr>
         </p:nvSpPr>
-        <p:spPr/>
-        <p:txBody>
-          <a:bodyPr/>
-          <a:lstStyle/>
-          <a:p>
-            <a:r>
-              <a:rPr kumimoji="1" lang="en-US" altLang="ja-JP" dirty="0"/>
-              <a:t>Scheduler</a:t>
-            </a:r>
-            <a:endParaRPr kumimoji="1" lang="ja-JP" altLang="en-US" dirty="0"/>
-          </a:p>
-        </p:txBody>
-      </p:sp>
-      <p:sp>
-        <p:nvSpPr>
-          <p:cNvPr id="3" name="コンテンツ プレースホルダー 2"/>
-          <p:cNvSpPr>
-            <a:spLocks noGrp="1"/>
-          </p:cNvSpPr>
-          <p:nvPr>
-            <p:ph idx="1"/>
-          </p:nvPr>
-        </p:nvSpPr>
-        <p:spPr/>
-        <p:txBody>
-          <a:bodyPr/>
-          <a:lstStyle/>
-          <a:p>
-            <a:r>
-              <a:rPr kumimoji="1" lang="en-US" altLang="ja-JP" dirty="0"/>
-              <a:t>Time-slot-based</a:t>
-            </a:r>
-          </a:p>
-          <a:p>
-            <a:r>
-              <a:rPr lang="en-US" altLang="ja-JP" dirty="0"/>
-              <a:t>Reduces the p</a:t>
-            </a:r>
-            <a:r>
-              <a:rPr kumimoji="1" lang="en-US" altLang="ja-JP" dirty="0"/>
-              <a:t>ower supplied via I2C bus</a:t>
-            </a:r>
-          </a:p>
-          <a:p>
-            <a:pPr marL="0" indent="0">
-              <a:buNone/>
-            </a:pPr>
-            <a:endParaRPr kumimoji="1" lang="en-US" altLang="ja-JP" dirty="0"/>
-          </a:p>
-          <a:p>
-            <a:endParaRPr kumimoji="1" lang="en-US" altLang="ja-JP" dirty="0"/>
-          </a:p>
-          <a:p>
-            <a:endParaRPr kumimoji="1" lang="ja-JP" altLang="en-US" dirty="0"/>
-          </a:p>
-        </p:txBody>
-      </p:sp>
-      <p:sp>
-        <p:nvSpPr>
-          <p:cNvPr id="4" name="正方形/長方形 3">
-            <a:extLst>
-              <a:ext uri="{FF2B5EF4-FFF2-40B4-BE49-F238E27FC236}">
-                <a16:creationId xmlns:a16="http://schemas.microsoft.com/office/drawing/2014/main" id="{A9409094-AF35-4C4A-937F-353763898F81}"/>
-              </a:ext>
-            </a:extLst>
-          </p:cNvPr>
-          <p:cNvSpPr/>
-          <p:nvPr/>
-        </p:nvSpPr>
-        <p:spPr>
-          <a:xfrm>
-            <a:off x="923109" y="3457303"/>
-            <a:ext cx="10430691" cy="2325188"/>
-          </a:xfrm>
-          <a:prstGeom prst="rect">
-            <a:avLst/>
-          </a:prstGeom>
-          <a:solidFill>
-            <a:schemeClr val="accent6">
-              <a:lumMod val="75000"/>
-            </a:schemeClr>
-          </a:solidFill>
-        </p:spPr>
-        <p:style>
-          <a:lnRef idx="2">
-            <a:schemeClr val="accent1">
-              <a:shade val="50000"/>
-            </a:schemeClr>
-          </a:lnRef>
-          <a:fillRef idx="1">
-            <a:schemeClr val="accent1"/>
-          </a:fillRef>
-          <a:effectRef idx="0">
-            <a:schemeClr val="accent1"/>
-          </a:effectRef>
-          <a:fontRef idx="minor">
-            <a:schemeClr val="lt1"/>
-          </a:fontRef>
-        </p:style>
-        <p:txBody>
-          <a:bodyPr rtlCol="0" anchor="ctr"/>
-          <a:lstStyle/>
-          <a:p>
-            <a:r>
-              <a:rPr kumimoji="1" lang="en-US" altLang="ja-JP" u="sng" dirty="0"/>
-              <a:t>Recommendation</a:t>
-            </a:r>
-          </a:p>
-          <a:p>
-            <a:endParaRPr lang="en-US" altLang="ja-JP" dirty="0"/>
-          </a:p>
-          <a:p>
-            <a:r>
-              <a:rPr lang="en-US" altLang="ja-JP" dirty="0"/>
-              <a:t>Use MCU (such as PIC16F1) or </a:t>
-            </a:r>
-            <a:r>
-              <a:rPr lang="en-US" altLang="ja-JP" dirty="0" err="1"/>
-              <a:t>mbed</a:t>
-            </a:r>
-            <a:r>
-              <a:rPr lang="en-US" altLang="ja-JP" dirty="0"/>
-              <a:t> as a basis of mini PLC.</a:t>
-            </a:r>
-          </a:p>
-          <a:p>
-            <a:endParaRPr kumimoji="1" lang="en-US" altLang="ja-JP" dirty="0"/>
-          </a:p>
-          <a:p>
-            <a:r>
-              <a:rPr lang="en-US" altLang="ja-JP" dirty="0"/>
-              <a:t>Linux is not good at real-time processing, so this I2C backplane may not work well.</a:t>
-            </a:r>
-          </a:p>
-          <a:p>
-            <a:endParaRPr kumimoji="1" lang="ja-JP" altLang="en-US" dirty="0"/>
-          </a:p>
-        </p:txBody>
-      </p:sp>
-    </p:spTree>
-    <p:extLst>
-      <p:ext uri="{BB962C8B-B14F-4D97-AF65-F5344CB8AC3E}">
-        <p14:creationId xmlns:p14="http://schemas.microsoft.com/office/powerpoint/2010/main" val="3431797438"/>
-      </p:ext>
-    </p:extLst>
-  </p:cSld>
-  <p:clrMapOvr>
-    <a:masterClrMapping/>
-  </p:clrMapOvr>
-</p:sld>
-</file>
-
-<file path=ppt/slides/slide5.xml><?xml version="1.0" encoding="utf-8"?>
-<p:sld xmlns:a="http://schemas.openxmlformats.org/drawingml/2006/main" xmlns:r="http://schemas.openxmlformats.org/officeDocument/2006/relationships" xmlns:p="http://schemas.openxmlformats.org/presentationml/2006/main">
-  <p:cSld>
-    <p:spTree>
-      <p:nvGrpSpPr>
-        <p:cNvPr id="1" name=""/>
-        <p:cNvGrpSpPr/>
-        <p:nvPr/>
-      </p:nvGrpSpPr>
-      <p:grpSpPr>
-        <a:xfrm>
-          <a:off x="0" y="0"/>
-          <a:ext cx="0" cy="0"/>
-          <a:chOff x="0" y="0"/>
-          <a:chExt cx="0" cy="0"/>
-        </a:xfrm>
-      </p:grpSpPr>
-      <p:sp>
-        <p:nvSpPr>
-          <p:cNvPr id="2" name="タイトル 1"/>
-          <p:cNvSpPr>
-            <a:spLocks noGrp="1"/>
-          </p:cNvSpPr>
-          <p:nvPr>
-            <p:ph type="title"/>
-          </p:nvPr>
-        </p:nvSpPr>
         <p:spPr>
           <a:xfrm>
             <a:off x="838200" y="365125"/>
@@ -5016,7 +4847,15 @@
           <a:p>
             <a:r>
               <a:rPr kumimoji="1" lang="en-US" altLang="ja-JP" dirty="0"/>
-              <a:t>Scheduler and 50msec time slot</a:t>
+              <a:t>Scheduler and </a:t>
+            </a:r>
+            <a:r>
+              <a:rPr lang="en-US" altLang="ja-JP" dirty="0"/>
+              <a:t>8</a:t>
+            </a:r>
+            <a:r>
+              <a:rPr kumimoji="1" lang="en-US" altLang="ja-JP" dirty="0"/>
+              <a:t>msec time slot</a:t>
             </a:r>
             <a:endParaRPr kumimoji="1" lang="ja-JP" altLang="en-US" dirty="0"/>
           </a:p>
@@ -5031,7 +4870,7 @@
           <p:nvPr>
             <p:extLst>
               <p:ext uri="{D42A27DB-BD31-4B8C-83A1-F6EECF244321}">
-                <p14:modId xmlns:p14="http://schemas.microsoft.com/office/powerpoint/2010/main" val="1113001179"/>
+                <p14:modId xmlns:p14="http://schemas.microsoft.com/office/powerpoint/2010/main" val="1254460711"/>
               </p:ext>
             </p:extLst>
           </p:nvPr>
@@ -5207,7 +5046,7 @@
                     <a:p>
                       <a:r>
                         <a:rPr kumimoji="1" lang="en-US" altLang="ja-JP" sz="1100" dirty="0"/>
-                        <a:t>INV</a:t>
+                        <a:t>NOP</a:t>
                       </a:r>
                       <a:endParaRPr kumimoji="1" lang="ja-JP" altLang="en-US" sz="1100" dirty="0"/>
                     </a:p>
@@ -5249,7 +5088,7 @@
                     <a:p>
                       <a:r>
                         <a:rPr kumimoji="1" lang="en-US" altLang="ja-JP" sz="1100" dirty="0"/>
-                        <a:t>SEN</a:t>
+                        <a:t>NOP</a:t>
                       </a:r>
                       <a:endParaRPr kumimoji="1" lang="ja-JP" altLang="en-US" sz="1100" dirty="0"/>
                     </a:p>
@@ -5291,7 +5130,7 @@
                     <a:p>
                       <a:r>
                         <a:rPr kumimoji="1" lang="en-US" altLang="ja-JP" sz="1100" dirty="0"/>
-                        <a:t>INV</a:t>
+                        <a:t>NOP</a:t>
                       </a:r>
                       <a:endParaRPr kumimoji="1" lang="ja-JP" altLang="en-US" sz="1100" dirty="0"/>
                     </a:p>
@@ -5333,7 +5172,7 @@
                     <a:p>
                       <a:r>
                         <a:rPr kumimoji="1" lang="en-US" altLang="ja-JP" sz="1100" dirty="0"/>
-                        <a:t>SEN</a:t>
+                        <a:t>NOP</a:t>
                       </a:r>
                       <a:endParaRPr kumimoji="1" lang="ja-JP" altLang="en-US" sz="1100" dirty="0"/>
                     </a:p>
@@ -5375,7 +5214,7 @@
                     <a:p>
                       <a:r>
                         <a:rPr kumimoji="1" lang="en-US" altLang="ja-JP" sz="1100" dirty="0"/>
-                        <a:t>INV</a:t>
+                        <a:t>NOP</a:t>
                       </a:r>
                       <a:endParaRPr kumimoji="1" lang="ja-JP" altLang="en-US" sz="1100" dirty="0"/>
                     </a:p>
@@ -5417,7 +5256,7 @@
                     <a:p>
                       <a:r>
                         <a:rPr kumimoji="1" lang="en-US" altLang="ja-JP" sz="1100" dirty="0"/>
-                        <a:t>SEN</a:t>
+                        <a:t>NOP</a:t>
                       </a:r>
                       <a:endParaRPr kumimoji="1" lang="ja-JP" altLang="en-US" sz="1100" dirty="0"/>
                     </a:p>
@@ -5459,7 +5298,7 @@
                     <a:p>
                       <a:r>
                         <a:rPr kumimoji="1" lang="en-US" altLang="ja-JP" sz="1100" dirty="0"/>
-                        <a:t>ADT</a:t>
+                        <a:t>NOP</a:t>
                       </a:r>
                       <a:endParaRPr kumimoji="1" lang="ja-JP" altLang="en-US" sz="1100" dirty="0"/>
                     </a:p>
@@ -5627,7 +5466,7 @@
                     <a:p>
                       <a:r>
                         <a:rPr kumimoji="1" lang="en-US" altLang="ja-JP" sz="1100" dirty="0"/>
-                        <a:t>SEN</a:t>
+                        <a:t>NOP</a:t>
                       </a:r>
                       <a:endParaRPr kumimoji="1" lang="ja-JP" altLang="en-US" sz="1100" dirty="0"/>
                     </a:p>
@@ -5669,7 +5508,7 @@
                     <a:p>
                       <a:r>
                         <a:rPr kumimoji="1" lang="en-US" altLang="ja-JP" sz="1100" dirty="0"/>
-                        <a:t>INV</a:t>
+                        <a:t>NOP</a:t>
                       </a:r>
                       <a:endParaRPr kumimoji="1" lang="ja-JP" altLang="en-US" sz="1100" dirty="0"/>
                     </a:p>
@@ -5711,7 +5550,7 @@
                     <a:p>
                       <a:r>
                         <a:rPr kumimoji="1" lang="en-US" altLang="ja-JP" sz="1100" dirty="0"/>
-                        <a:t>SEN</a:t>
+                        <a:t>NOP</a:t>
                       </a:r>
                       <a:endParaRPr kumimoji="1" lang="ja-JP" altLang="en-US" sz="1100" dirty="0"/>
                     </a:p>
@@ -5753,7 +5592,7 @@
                     <a:p>
                       <a:r>
                         <a:rPr kumimoji="1" lang="en-US" altLang="ja-JP" sz="1100" dirty="0"/>
-                        <a:t>INV</a:t>
+                        <a:t>NOP</a:t>
                       </a:r>
                       <a:endParaRPr kumimoji="1" lang="ja-JP" altLang="en-US" sz="1100" dirty="0"/>
                     </a:p>
@@ -5795,7 +5634,7 @@
                     <a:p>
                       <a:r>
                         <a:rPr kumimoji="1" lang="en-US" altLang="ja-JP" sz="1100" dirty="0"/>
-                        <a:t>SEN</a:t>
+                        <a:t>INV</a:t>
                       </a:r>
                       <a:endParaRPr kumimoji="1" lang="ja-JP" altLang="en-US" sz="1100" dirty="0"/>
                     </a:p>
@@ -5837,7 +5676,7 @@
                     <a:p>
                       <a:r>
                         <a:rPr kumimoji="1" lang="en-US" altLang="ja-JP" sz="1100" dirty="0"/>
-                        <a:t>INV</a:t>
+                        <a:t>NOP</a:t>
                       </a:r>
                       <a:endParaRPr kumimoji="1" lang="ja-JP" altLang="en-US" sz="1100" dirty="0"/>
                     </a:p>
@@ -5879,7 +5718,7 @@
                     <a:p>
                       <a:r>
                         <a:rPr kumimoji="1" lang="en-US" altLang="ja-JP" sz="1100" dirty="0"/>
-                        <a:t>SEN</a:t>
+                        <a:t>NOP</a:t>
                       </a:r>
                       <a:endParaRPr kumimoji="1" lang="ja-JP" altLang="en-US" sz="1100" dirty="0"/>
                     </a:p>
@@ -6480,7 +6319,7 @@
         <p:spPr>
           <a:xfrm>
             <a:off x="10709852" y="1373464"/>
-            <a:ext cx="726481" cy="261610"/>
+            <a:ext cx="344966" cy="261610"/>
           </a:xfrm>
           <a:prstGeom prst="rect">
             <a:avLst/>
@@ -6494,16 +6333,8 @@
           <a:lstStyle/>
           <a:p>
             <a:r>
-              <a:rPr lang="en-US" altLang="ja-JP" sz="1100" dirty="0"/>
-              <a:t>50</a:t>
-            </a:r>
-            <a:r>
-              <a:rPr kumimoji="1" lang="en-US" altLang="ja-JP" sz="1100" dirty="0"/>
-              <a:t> </a:t>
-            </a:r>
-            <a:r>
-              <a:rPr kumimoji="1" lang="en-US" altLang="ja-JP" sz="1100" dirty="0" err="1"/>
-              <a:t>msec</a:t>
+              <a:rPr lang="en-US" altLang="ja-JP" sz="1100" dirty="0" err="1"/>
+              <a:t>Ts</a:t>
             </a:r>
             <a:endParaRPr kumimoji="1" lang="ja-JP" altLang="en-US" sz="1100" dirty="0"/>
           </a:p>
@@ -6795,7 +6626,7 @@
         </p:nvSpPr>
         <p:spPr>
           <a:xfrm>
-            <a:off x="11660554" y="3933923"/>
+            <a:off x="11338335" y="3925214"/>
             <a:ext cx="874206" cy="261610"/>
           </a:xfrm>
           <a:prstGeom prst="rect">
@@ -6810,8 +6641,12 @@
           <a:lstStyle/>
           <a:p>
             <a:r>
+              <a:rPr kumimoji="1" lang="en-US" altLang="ja-JP" sz="1100" dirty="0" err="1"/>
+              <a:t>Ts</a:t>
+            </a:r>
+            <a:r>
               <a:rPr kumimoji="1" lang="en-US" altLang="ja-JP" sz="1100" dirty="0"/>
-              <a:t>1sec</a:t>
+              <a:t> * 20</a:t>
             </a:r>
             <a:endParaRPr kumimoji="1" lang="ja-JP" altLang="en-US" sz="1100" dirty="0"/>
           </a:p>
@@ -6825,7 +6660,7 @@
         </p:nvSpPr>
         <p:spPr>
           <a:xfrm>
-            <a:off x="11419408" y="1461157"/>
+            <a:off x="11097187" y="1461157"/>
             <a:ext cx="205575" cy="5196840"/>
           </a:xfrm>
           <a:prstGeom prst="rightBrace">
@@ -7070,7 +6905,7 @@
 </p:sld>
 </file>
 
-<file path=ppt/slides/slide6.xml><?xml version="1.0" encoding="utf-8"?>
+<file path=ppt/slides/slide5.xml><?xml version="1.0" encoding="utf-8"?>
 <p:sld xmlns:a="http://schemas.openxmlformats.org/drawingml/2006/main" xmlns:r="http://schemas.openxmlformats.org/officeDocument/2006/relationships" xmlns:p="http://schemas.openxmlformats.org/presentationml/2006/main">
   <p:cSld>
     <p:spTree>
@@ -8170,7 +8005,7 @@
 </p:sld>
 </file>
 
-<file path=ppt/slides/slide7.xml><?xml version="1.0" encoding="utf-8"?>
+<file path=ppt/slides/slide6.xml><?xml version="1.0" encoding="utf-8"?>
 <p:sld xmlns:a="http://schemas.openxmlformats.org/drawingml/2006/main" xmlns:r="http://schemas.openxmlformats.org/officeDocument/2006/relationships" xmlns:p="http://schemas.openxmlformats.org/presentationml/2006/main">
   <p:cSld>
     <p:spTree>
@@ -9810,7 +9645,7 @@
 </p:sld>
 </file>
 
-<file path=ppt/slides/slide8.xml><?xml version="1.0" encoding="utf-8"?>
+<file path=ppt/slides/slide7.xml><?xml version="1.0" encoding="utf-8"?>
 <p:sld xmlns:a="http://schemas.openxmlformats.org/drawingml/2006/main" xmlns:r="http://schemas.openxmlformats.org/officeDocument/2006/relationships" xmlns:p="http://schemas.openxmlformats.org/presentationml/2006/main">
   <p:cSld>
     <p:spTree>

</xml_diff>